<commit_message>
react-app build deployed, presentation updated
</commit_message>
<xml_diff>
--- a/documentation/presentation.pptx
+++ b/documentation/presentation.pptx
@@ -109,7 +109,16 @@
       </a:defRPr>
     </a:lvl9pPr>
   </p:defaultTextStyle>
+  <p:extLst>
+    <p:ext uri="{EFAFB233-063F-42B5-8137-9DF3F51BA10A}">
+      <p15:sldGuideLst xmlns:p15="http://schemas.microsoft.com/office/powerpoint/2012/main"/>
+    </p:ext>
+  </p:extLst>
 </p:presentation>
+</file>
+
+<file path=ppt/revisionInfo.xml><?xml version="1.0" encoding="utf-8"?>
+<p1510:revInfo xmlns:a="http://schemas.openxmlformats.org/drawingml/2006/main" xmlns:r="http://schemas.openxmlformats.org/officeDocument/2006/relationships" xmlns:p1510="http://schemas.microsoft.com/office/powerpoint/2015/10/main"/>
 </file>
 
 <file path=ppt/slideLayouts/slideLayout1.xml><?xml version="1.0" encoding="utf-8"?>
@@ -5955,13 +5964,27 @@
           <a:p>
             <a:r>
               <a:rPr lang="en-US" dirty="0"/>
-              <a:t>First we discuss what type of game we wanted to create and what setting the game should take place.</a:t>
-            </a:r>
-          </a:p>
-          <a:p>
+              <a:t>First we discussed what type of game we wanted to create and what setting the game should take place in.</a:t>
+            </a:r>
+          </a:p>
+          <a:p>
+            <a:pPr lvl="1"/>
             <a:r>
               <a:rPr lang="en-US" dirty="0"/>
-              <a:t>Once we figured it out  the game we wanted to design, then we used </a:t>
+              <a:t>Platformer</a:t>
+            </a:r>
+          </a:p>
+          <a:p>
+            <a:pPr lvl="1"/>
+            <a:r>
+              <a:rPr lang="en-US" dirty="0"/>
+              <a:t>Gained abilities</a:t>
+            </a:r>
+          </a:p>
+          <a:p>
+            <a:r>
+              <a:rPr lang="en-US" dirty="0"/>
+              <a:t>Once we decided on a game concept, we used </a:t>
             </a:r>
             <a:r>
               <a:rPr lang="en-US" dirty="0" err="1"/>
@@ -5969,14 +5992,14 @@
             </a:r>
             <a:r>
               <a:rPr lang="en-US" dirty="0"/>
-              <a:t> UML to figured out our classes, method, and variable for our game</a:t>
-            </a:r>
-          </a:p>
-          <a:p>
-            <a:r>
-              <a:rPr lang="en-US" dirty="0"/>
-              <a:t>We used Trello to assign what each team member should do and due dates</a:t>
-            </a:r>
+              <a:t> UML to design a general architecture to define class interactions. </a:t>
+            </a:r>
+          </a:p>
+          <a:p>
+            <a:pPr marL="0" indent="0">
+              <a:buNone/>
+            </a:pPr>
+            <a:endParaRPr lang="en-US" dirty="0"/>
           </a:p>
         </p:txBody>
       </p:sp>
@@ -6126,7 +6149,7 @@
           <a:p>
             <a:r>
               <a:rPr lang="en-US" dirty="0"/>
-              <a:t>Progression </a:t>
+              <a:t>Development </a:t>
             </a:r>
           </a:p>
         </p:txBody>
@@ -6154,23 +6177,40 @@
           <a:p>
             <a:r>
               <a:rPr lang="en-US" dirty="0"/>
-              <a:t>We changed the game design</a:t>
+              <a:t>We used Trello to assign tasks, keep organized, and track progress.</a:t>
             </a:r>
           </a:p>
           <a:p>
             <a:r>
               <a:rPr lang="en-US" dirty="0"/>
-              <a:t>We added new classes</a:t>
+              <a:t>Distributed design allowed for simultaneous development.</a:t>
             </a:r>
           </a:p>
           <a:p>
             <a:r>
               <a:rPr lang="en-US" dirty="0"/>
-              <a:t>We got rid of </a:t>
-            </a:r>
-            <a:r>
-              <a:rPr lang="en-US"/>
-              <a:t>tilemap</a:t>
+              <a:t>Redesigned the game throughout development.</a:t>
+            </a:r>
+          </a:p>
+          <a:p>
+            <a:pPr lvl="1"/>
+            <a:r>
+              <a:rPr lang="en-US" dirty="0"/>
+              <a:t>Added an object collision controller</a:t>
+            </a:r>
+          </a:p>
+          <a:p>
+            <a:pPr lvl="1"/>
+            <a:r>
+              <a:rPr lang="en-US" dirty="0"/>
+              <a:t>Re-designed player environment interaction</a:t>
+            </a:r>
+          </a:p>
+          <a:p>
+            <a:pPr lvl="1"/>
+            <a:r>
+              <a:rPr lang="en-US" dirty="0"/>
+              <a:t>Adapted design to fit sprite animation</a:t>
             </a:r>
           </a:p>
         </p:txBody>
@@ -6321,7 +6361,7 @@
           <a:p>
             <a:r>
               <a:rPr lang="en-US" dirty="0"/>
-              <a:t>Difficulty</a:t>
+              <a:t>Obstacles</a:t>
             </a:r>
           </a:p>
         </p:txBody>
@@ -6349,26 +6389,23 @@
           <a:p>
             <a:r>
               <a:rPr lang="en-US" dirty="0"/>
-              <a:t>Fixing all bus</a:t>
+              <a:t>Coordinating development with a six person team.</a:t>
             </a:r>
           </a:p>
           <a:p>
             <a:r>
               <a:rPr lang="en-US" dirty="0"/>
-              <a:t>Getting  the collision working with the art</a:t>
+              <a:t>Troubleshooting bugs in shared code.</a:t>
             </a:r>
           </a:p>
           <a:p>
             <a:r>
               <a:rPr lang="en-US" dirty="0"/>
-              <a:t>Matching the Level art with the background image</a:t>
-            </a:r>
-          </a:p>
-          <a:p>
-            <a:r>
-              <a:rPr lang="en-US" dirty="0"/>
-              <a:t>Having difficulty with the collision</a:t>
-            </a:r>
+              <a:t>Implementing smooth movement with centralized collision control.</a:t>
+            </a:r>
+          </a:p>
+          <a:p>
+            <a:endParaRPr lang="en-US" dirty="0"/>
           </a:p>
         </p:txBody>
       </p:sp>

</xml_diff>